<commit_message>
Set up slides for front-end
</commit_message>
<xml_diff>
--- a/Phase 2 Documentation/Team_2_Presentation_2.pptx
+++ b/Phase 2 Documentation/Team_2_Presentation_2.pptx
@@ -6200,7 +6200,7 @@
           <a:p>
             <a:fld id="{40BFA2F5-D8EE-4C13-8817-1BE250F639AB}" type="datetimeFigureOut">
               <a:rPr lang="en-US" smtClean="0"/>
-              <a:t>3/4/2025</a:t>
+              <a:t>3/9/2025</a:t>
             </a:fld>
             <a:endParaRPr lang="en-US"/>
           </a:p>
@@ -6614,7 +6614,7 @@
           <a:p>
             <a:fld id="{40BFA2F5-D8EE-4C13-8817-1BE250F639AB}" type="datetimeFigureOut">
               <a:rPr lang="en-US" smtClean="0"/>
-              <a:t>3/4/2025</a:t>
+              <a:t>3/9/2025</a:t>
             </a:fld>
             <a:endParaRPr lang="en-US"/>
           </a:p>
@@ -6950,7 +6950,7 @@
           <a:p>
             <a:fld id="{40BFA2F5-D8EE-4C13-8817-1BE250F639AB}" type="datetimeFigureOut">
               <a:rPr lang="en-US" smtClean="0"/>
-              <a:t>3/4/2025</a:t>
+              <a:t>3/9/2025</a:t>
             </a:fld>
             <a:endParaRPr lang="en-US"/>
           </a:p>
@@ -7355,7 +7355,7 @@
           <a:p>
             <a:fld id="{40BFA2F5-D8EE-4C13-8817-1BE250F639AB}" type="datetimeFigureOut">
               <a:rPr lang="en-US" smtClean="0"/>
-              <a:t>3/4/2025</a:t>
+              <a:t>3/9/2025</a:t>
             </a:fld>
             <a:endParaRPr lang="en-US"/>
           </a:p>
@@ -7923,7 +7923,7 @@
           <a:p>
             <a:fld id="{40BFA2F5-D8EE-4C13-8817-1BE250F639AB}" type="datetimeFigureOut">
               <a:rPr lang="en-US" smtClean="0"/>
-              <a:t>3/4/2025</a:t>
+              <a:t>3/9/2025</a:t>
             </a:fld>
             <a:endParaRPr lang="en-US"/>
           </a:p>
@@ -8604,7 +8604,7 @@
           <a:p>
             <a:fld id="{40BFA2F5-D8EE-4C13-8817-1BE250F639AB}" type="datetimeFigureOut">
               <a:rPr lang="en-US" smtClean="0"/>
-              <a:t>3/4/2025</a:t>
+              <a:t>3/9/2025</a:t>
             </a:fld>
             <a:endParaRPr lang="en-US"/>
           </a:p>
@@ -9517,7 +9517,7 @@
           <a:p>
             <a:fld id="{40BFA2F5-D8EE-4C13-8817-1BE250F639AB}" type="datetimeFigureOut">
               <a:rPr lang="en-US" smtClean="0"/>
-              <a:t>3/4/2025</a:t>
+              <a:t>3/9/2025</a:t>
             </a:fld>
             <a:endParaRPr lang="en-US"/>
           </a:p>
@@ -9830,7 +9830,7 @@
           <a:p>
             <a:fld id="{40BFA2F5-D8EE-4C13-8817-1BE250F639AB}" type="datetimeFigureOut">
               <a:rPr lang="en-US" smtClean="0"/>
-              <a:t>3/4/2025</a:t>
+              <a:t>3/9/2025</a:t>
             </a:fld>
             <a:endParaRPr lang="en-US"/>
           </a:p>
@@ -10094,7 +10094,7 @@
           <a:p>
             <a:fld id="{40BFA2F5-D8EE-4C13-8817-1BE250F639AB}" type="datetimeFigureOut">
               <a:rPr lang="en-US" smtClean="0"/>
-              <a:t>3/4/2025</a:t>
+              <a:t>3/9/2025</a:t>
             </a:fld>
             <a:endParaRPr lang="en-US"/>
           </a:p>
@@ -10417,7 +10417,7 @@
           <a:p>
             <a:fld id="{40BFA2F5-D8EE-4C13-8817-1BE250F639AB}" type="datetimeFigureOut">
               <a:rPr lang="en-US" smtClean="0"/>
-              <a:t>3/4/2025</a:t>
+              <a:t>3/9/2025</a:t>
             </a:fld>
             <a:endParaRPr lang="en-US"/>
           </a:p>
@@ -10806,7 +10806,7 @@
           <a:p>
             <a:fld id="{40BFA2F5-D8EE-4C13-8817-1BE250F639AB}" type="datetimeFigureOut">
               <a:rPr lang="en-US" smtClean="0"/>
-              <a:t>3/4/2025</a:t>
+              <a:t>3/9/2025</a:t>
             </a:fld>
             <a:endParaRPr lang="en-US"/>
           </a:p>
@@ -11182,7 +11182,7 @@
           <a:p>
             <a:fld id="{40BFA2F5-D8EE-4C13-8817-1BE250F639AB}" type="datetimeFigureOut">
               <a:rPr lang="en-US" smtClean="0"/>
-              <a:t>3/4/2025</a:t>
+              <a:t>3/9/2025</a:t>
             </a:fld>
             <a:endParaRPr lang="en-US"/>
           </a:p>
@@ -11688,7 +11688,7 @@
           <a:p>
             <a:fld id="{40BFA2F5-D8EE-4C13-8817-1BE250F639AB}" type="datetimeFigureOut">
               <a:rPr lang="en-US" smtClean="0"/>
-              <a:t>3/4/2025</a:t>
+              <a:t>3/9/2025</a:t>
             </a:fld>
             <a:endParaRPr lang="en-US"/>
           </a:p>
@@ -11945,7 +11945,7 @@
           <a:p>
             <a:fld id="{40BFA2F5-D8EE-4C13-8817-1BE250F639AB}" type="datetimeFigureOut">
               <a:rPr lang="en-US" smtClean="0"/>
-              <a:t>3/4/2025</a:t>
+              <a:t>3/9/2025</a:t>
             </a:fld>
             <a:endParaRPr lang="en-US"/>
           </a:p>
@@ -12108,7 +12108,7 @@
           <a:p>
             <a:fld id="{40BFA2F5-D8EE-4C13-8817-1BE250F639AB}" type="datetimeFigureOut">
               <a:rPr lang="en-US" smtClean="0"/>
-              <a:t>3/4/2025</a:t>
+              <a:t>3/9/2025</a:t>
             </a:fld>
             <a:endParaRPr lang="en-US"/>
           </a:p>
@@ -12498,7 +12498,7 @@
           <a:p>
             <a:fld id="{40BFA2F5-D8EE-4C13-8817-1BE250F639AB}" type="datetimeFigureOut">
               <a:rPr lang="en-US" smtClean="0"/>
-              <a:t>3/4/2025</a:t>
+              <a:t>3/9/2025</a:t>
             </a:fld>
             <a:endParaRPr lang="en-US"/>
           </a:p>
@@ -12907,7 +12907,7 @@
           <a:p>
             <a:fld id="{40BFA2F5-D8EE-4C13-8817-1BE250F639AB}" type="datetimeFigureOut">
               <a:rPr lang="en-US" smtClean="0"/>
-              <a:t>3/4/2025</a:t>
+              <a:t>3/9/2025</a:t>
             </a:fld>
             <a:endParaRPr lang="en-US"/>
           </a:p>
@@ -13151,7 +13151,7 @@
           <a:p>
             <a:fld id="{40BFA2F5-D8EE-4C13-8817-1BE250F639AB}" type="datetimeFigureOut">
               <a:rPr lang="en-US" smtClean="0"/>
-              <a:t>3/4/2025</a:t>
+              <a:t>3/9/2025</a:t>
             </a:fld>
             <a:endParaRPr lang="en-US"/>
           </a:p>
@@ -15575,7 +15575,10 @@
           <a:bodyPr/>
           <a:lstStyle/>
           <a:p>
-            <a:endParaRPr lang="en-US"/>
+            <a:r>
+              <a:rPr lang="en-US" dirty="0"/>
+              <a:t>Front-end architecture diagram</a:t>
+            </a:r>
           </a:p>
         </p:txBody>
       </p:sp>
@@ -15661,7 +15664,15 @@
           <a:bodyPr/>
           <a:lstStyle/>
           <a:p>
-            <a:endParaRPr lang="en-US"/>
+            <a:r>
+              <a:rPr lang="en-US" dirty="0"/>
+              <a:t>APIs</a:t>
+            </a:r>
+            <a:r>
+              <a:rPr lang="en-US"/>
+              <a:t>/technology used </a:t>
+            </a:r>
+            <a:endParaRPr lang="en-US" dirty="0"/>
           </a:p>
         </p:txBody>
       </p:sp>

</xml_diff>

<commit_message>
Added a architecture diagram
</commit_message>
<xml_diff>
--- a/Phase 2 Documentation/Team_2_Presentation_2.pptx
+++ b/Phase 2 Documentation/Team_2_Presentation_2.pptx
@@ -15576,37 +15576,51 @@
           <a:lstStyle/>
           <a:p>
             <a:r>
+              <a:rPr lang="en-US"/>
+              <a:t>Architecture </a:t>
+            </a:r>
+            <a:r>
               <a:rPr lang="en-US" dirty="0"/>
-              <a:t>Front-end architecture diagram</a:t>
+              <a:t>diagram</a:t>
             </a:r>
           </a:p>
         </p:txBody>
       </p:sp>
-      <p:sp>
-        <p:nvSpPr>
-          <p:cNvPr id="3" name="Content Placeholder 2">
+      <p:pic>
+        <p:nvPicPr>
+          <p:cNvPr id="7" name="Content Placeholder 6" descr="A diagram of a computer&#10;&#10;Description automatically generated">
             <a:extLst>
               <a:ext uri="{FF2B5EF4-FFF2-40B4-BE49-F238E27FC236}">
-                <a16:creationId xmlns:a16="http://schemas.microsoft.com/office/drawing/2014/main" id="{6B007754-9A68-5F9B-CF3C-54E3BB06F781}"/>
+                <a16:creationId xmlns:a16="http://schemas.microsoft.com/office/drawing/2014/main" id="{7DE6F67B-2143-D923-9C43-635DA1686158}"/>
               </a:ext>
             </a:extLst>
           </p:cNvPr>
-          <p:cNvSpPr>
-            <a:spLocks noGrp="1"/>
-          </p:cNvSpPr>
+          <p:cNvPicPr>
+            <a:picLocks noGrp="1" noChangeAspect="1"/>
+          </p:cNvPicPr>
           <p:nvPr>
             <p:ph idx="1"/>
           </p:nvPr>
-        </p:nvSpPr>
-        <p:spPr/>
-        <p:txBody>
-          <a:bodyPr/>
-          <a:lstStyle/>
-          <a:p>
-            <a:endParaRPr lang="en-US"/>
-          </a:p>
-        </p:txBody>
-      </p:sp>
+        </p:nvPicPr>
+        <p:blipFill>
+          <a:blip r:embed="rId2">
+            <a:extLst>
+              <a:ext uri="{28A0092B-C50C-407E-A947-70E740481C1C}">
+                <a14:useLocalDpi xmlns:a14="http://schemas.microsoft.com/office/drawing/2010/main" val="0"/>
+              </a:ext>
+            </a:extLst>
+          </a:blip>
+          <a:stretch>
+            <a:fillRect/>
+          </a:stretch>
+        </p:blipFill>
+        <p:spPr>
+          <a:xfrm>
+            <a:off x="2630184" y="1979760"/>
+            <a:ext cx="6554913" cy="4878240"/>
+          </a:xfrm>
+        </p:spPr>
+      </p:pic>
     </p:spTree>
     <p:extLst>
       <p:ext uri="{BB962C8B-B14F-4D97-AF65-F5344CB8AC3E}">

</xml_diff>

<commit_message>
Added some APIs and questions slides
</commit_message>
<xml_diff>
--- a/Phase 2 Documentation/Team_2_Presentation_2.pptx
+++ b/Phase 2 Documentation/Team_2_Presentation_2.pptx
@@ -16083,7 +16083,10 @@
           <a:bodyPr/>
           <a:lstStyle/>
           <a:p>
-            <a:endParaRPr lang="en-US"/>
+            <a:r>
+              <a:rPr lang="en-US" dirty="0"/>
+              <a:t>Questions?</a:t>
+            </a:r>
           </a:p>
         </p:txBody>
       </p:sp>
@@ -17349,7 +17352,16 @@
           </a:bodyPr>
           <a:lstStyle/>
           <a:p>
-            <a:endParaRPr lang="en-US" dirty="0"/>
+            <a:r>
+              <a:rPr lang="en-US" dirty="0"/>
+              <a:t>Google Drive’s API</a:t>
+            </a:r>
+          </a:p>
+          <a:p>
+            <a:r>
+              <a:rPr lang="en-US" dirty="0"/>
+              <a:t>Google’s Login API</a:t>
+            </a:r>
           </a:p>
         </p:txBody>
       </p:sp>

</xml_diff>

<commit_message>
Made changes to the Phase 2 Presentation
</commit_message>
<xml_diff>
--- a/Phase 2 Documentation/Team_2_Presentation_2.pptx
+++ b/Phase 2 Documentation/Team_2_Presentation_2.pptx
@@ -7,9 +7,9 @@
   <p:sldIdLst>
     <p:sldId id="256" r:id="rId2"/>
     <p:sldId id="257" r:id="rId3"/>
-    <p:sldId id="260" r:id="rId4"/>
-    <p:sldId id="261" r:id="rId5"/>
-    <p:sldId id="265" r:id="rId6"/>
+    <p:sldId id="265" r:id="rId4"/>
+    <p:sldId id="260" r:id="rId5"/>
+    <p:sldId id="261" r:id="rId6"/>
     <p:sldId id="262" r:id="rId7"/>
     <p:sldId id="259" r:id="rId8"/>
     <p:sldId id="263" r:id="rId9"/>
@@ -16640,6 +16640,142 @@
 <file path=ppt/slides/slide3.xml><?xml version="1.0" encoding="utf-8"?>
 <p:sld xmlns:a="http://schemas.openxmlformats.org/drawingml/2006/main" xmlns:r="http://schemas.openxmlformats.org/officeDocument/2006/relationships" xmlns:p="http://schemas.openxmlformats.org/presentationml/2006/main">
   <p:cSld>
+    <p:spTree>
+      <p:nvGrpSpPr>
+        <p:cNvPr id="1" name="">
+          <a:extLst>
+            <a:ext uri="{FF2B5EF4-FFF2-40B4-BE49-F238E27FC236}">
+              <a16:creationId xmlns:a16="http://schemas.microsoft.com/office/drawing/2014/main" id="{CC27D892-C42E-E633-F475-930F3F6A0D49}"/>
+            </a:ext>
+          </a:extLst>
+        </p:cNvPr>
+        <p:cNvGrpSpPr/>
+        <p:nvPr/>
+      </p:nvGrpSpPr>
+      <p:grpSpPr>
+        <a:xfrm>
+          <a:off x="0" y="0"/>
+          <a:ext cx="0" cy="0"/>
+          <a:chOff x="0" y="0"/>
+          <a:chExt cx="0" cy="0"/>
+        </a:xfrm>
+      </p:grpSpPr>
+      <p:sp>
+        <p:nvSpPr>
+          <p:cNvPr id="2" name="Title 1">
+            <a:extLst>
+              <a:ext uri="{FF2B5EF4-FFF2-40B4-BE49-F238E27FC236}">
+                <a16:creationId xmlns:a16="http://schemas.microsoft.com/office/drawing/2014/main" id="{591B2511-AC71-BC7A-D4A3-D7F0CE6603F6}"/>
+              </a:ext>
+            </a:extLst>
+          </p:cNvPr>
+          <p:cNvSpPr>
+            <a:spLocks noGrp="1"/>
+          </p:cNvSpPr>
+          <p:nvPr>
+            <p:ph type="title"/>
+          </p:nvPr>
+        </p:nvSpPr>
+        <p:spPr/>
+        <p:txBody>
+          <a:bodyPr/>
+          <a:lstStyle/>
+          <a:p>
+            <a:r>
+              <a:rPr lang="en-US" dirty="0"/>
+              <a:t>Current Front-end</a:t>
+            </a:r>
+          </a:p>
+        </p:txBody>
+      </p:sp>
+      <p:pic>
+        <p:nvPicPr>
+          <p:cNvPr id="6" name="Picture 5" descr="A screenshot of a computer&#10;&#10;AI-generated content may be incorrect.">
+            <a:extLst>
+              <a:ext uri="{FF2B5EF4-FFF2-40B4-BE49-F238E27FC236}">
+                <a16:creationId xmlns:a16="http://schemas.microsoft.com/office/drawing/2014/main" id="{F33971A1-55D1-03E6-1CA9-B0CD190C0144}"/>
+              </a:ext>
+            </a:extLst>
+          </p:cNvPr>
+          <p:cNvPicPr>
+            <a:picLocks noChangeAspect="1"/>
+          </p:cNvPicPr>
+          <p:nvPr/>
+        </p:nvPicPr>
+        <p:blipFill>
+          <a:blip r:embed="rId2">
+            <a:extLst>
+              <a:ext uri="{28A0092B-C50C-407E-A947-70E740481C1C}">
+                <a14:useLocalDpi xmlns:a14="http://schemas.microsoft.com/office/drawing/2010/main" val="0"/>
+              </a:ext>
+            </a:extLst>
+          </a:blip>
+          <a:stretch>
+            <a:fillRect/>
+          </a:stretch>
+        </p:blipFill>
+        <p:spPr>
+          <a:xfrm>
+            <a:off x="287129" y="2586157"/>
+            <a:ext cx="5643220" cy="3518615"/>
+          </a:xfrm>
+          <a:prstGeom prst="rect">
+            <a:avLst/>
+          </a:prstGeom>
+        </p:spPr>
+      </p:pic>
+      <p:pic>
+        <p:nvPicPr>
+          <p:cNvPr id="8" name="Picture 7" descr="A screenshot of a computer&#10;&#10;AI-generated content may be incorrect.">
+            <a:extLst>
+              <a:ext uri="{FF2B5EF4-FFF2-40B4-BE49-F238E27FC236}">
+                <a16:creationId xmlns:a16="http://schemas.microsoft.com/office/drawing/2014/main" id="{69B920AB-4556-B5B7-C57F-2E64D9013DF5}"/>
+              </a:ext>
+            </a:extLst>
+          </p:cNvPr>
+          <p:cNvPicPr>
+            <a:picLocks noChangeAspect="1"/>
+          </p:cNvPicPr>
+          <p:nvPr/>
+        </p:nvPicPr>
+        <p:blipFill>
+          <a:blip r:embed="rId3">
+            <a:extLst>
+              <a:ext uri="{28A0092B-C50C-407E-A947-70E740481C1C}">
+                <a14:useLocalDpi xmlns:a14="http://schemas.microsoft.com/office/drawing/2010/main" val="0"/>
+              </a:ext>
+            </a:extLst>
+          </a:blip>
+          <a:stretch>
+            <a:fillRect/>
+          </a:stretch>
+        </p:blipFill>
+        <p:spPr>
+          <a:xfrm>
+            <a:off x="6261652" y="2586157"/>
+            <a:ext cx="5643219" cy="3518615"/>
+          </a:xfrm>
+          <a:prstGeom prst="rect">
+            <a:avLst/>
+          </a:prstGeom>
+        </p:spPr>
+      </p:pic>
+    </p:spTree>
+    <p:extLst>
+      <p:ext uri="{BB962C8B-B14F-4D97-AF65-F5344CB8AC3E}">
+        <p14:creationId xmlns:p14="http://schemas.microsoft.com/office/powerpoint/2010/main" val="40109320"/>
+      </p:ext>
+    </p:extLst>
+  </p:cSld>
+  <p:clrMapOvr>
+    <a:masterClrMapping/>
+  </p:clrMapOvr>
+</p:sld>
+</file>
+
+<file path=ppt/slides/slide4.xml><?xml version="1.0" encoding="utf-8"?>
+<p:sld xmlns:a="http://schemas.openxmlformats.org/drawingml/2006/main" xmlns:r="http://schemas.openxmlformats.org/officeDocument/2006/relationships" xmlns:p="http://schemas.openxmlformats.org/presentationml/2006/main">
+  <p:cSld>
     <p:bg>
       <p:bgPr>
         <a:gradFill rotWithShape="1">
@@ -17051,7 +17187,7 @@
 </p:sld>
 </file>
 
-<file path=ppt/slides/slide4.xml><?xml version="1.0" encoding="utf-8"?>
+<file path=ppt/slides/slide5.xml><?xml version="1.0" encoding="utf-8"?>
 <p:sld xmlns:a="http://schemas.openxmlformats.org/drawingml/2006/main" xmlns:r="http://schemas.openxmlformats.org/officeDocument/2006/relationships" xmlns:p="http://schemas.openxmlformats.org/presentationml/2006/main">
   <p:cSld>
     <p:spTree>
@@ -17141,129 +17277,6 @@
     <p:extLst>
       <p:ext uri="{BB962C8B-B14F-4D97-AF65-F5344CB8AC3E}">
         <p14:creationId xmlns:p14="http://schemas.microsoft.com/office/powerpoint/2010/main" val="3731972070"/>
-      </p:ext>
-    </p:extLst>
-  </p:cSld>
-  <p:clrMapOvr>
-    <a:masterClrMapping/>
-  </p:clrMapOvr>
-</p:sld>
-</file>
-
-<file path=ppt/slides/slide5.xml><?xml version="1.0" encoding="utf-8"?>
-<p:sld xmlns:a="http://schemas.openxmlformats.org/drawingml/2006/main" xmlns:r="http://schemas.openxmlformats.org/officeDocument/2006/relationships" xmlns:p="http://schemas.openxmlformats.org/presentationml/2006/main">
-  <p:cSld>
-    <p:spTree>
-      <p:nvGrpSpPr>
-        <p:cNvPr id="1" name="">
-          <a:extLst>
-            <a:ext uri="{FF2B5EF4-FFF2-40B4-BE49-F238E27FC236}">
-              <a16:creationId xmlns:a16="http://schemas.microsoft.com/office/drawing/2014/main" id="{CC27D892-C42E-E633-F475-930F3F6A0D49}"/>
-            </a:ext>
-          </a:extLst>
-        </p:cNvPr>
-        <p:cNvGrpSpPr/>
-        <p:nvPr/>
-      </p:nvGrpSpPr>
-      <p:grpSpPr>
-        <a:xfrm>
-          <a:off x="0" y="0"/>
-          <a:ext cx="0" cy="0"/>
-          <a:chOff x="0" y="0"/>
-          <a:chExt cx="0" cy="0"/>
-        </a:xfrm>
-      </p:grpSpPr>
-      <p:sp>
-        <p:nvSpPr>
-          <p:cNvPr id="2" name="Title 1">
-            <a:extLst>
-              <a:ext uri="{FF2B5EF4-FFF2-40B4-BE49-F238E27FC236}">
-                <a16:creationId xmlns:a16="http://schemas.microsoft.com/office/drawing/2014/main" id="{591B2511-AC71-BC7A-D4A3-D7F0CE6603F6}"/>
-              </a:ext>
-            </a:extLst>
-          </p:cNvPr>
-          <p:cNvSpPr>
-            <a:spLocks noGrp="1"/>
-          </p:cNvSpPr>
-          <p:nvPr>
-            <p:ph type="title"/>
-          </p:nvPr>
-        </p:nvSpPr>
-        <p:spPr/>
-        <p:txBody>
-          <a:bodyPr/>
-          <a:lstStyle/>
-          <a:p>
-            <a:r>
-              <a:rPr lang="en-US" dirty="0"/>
-              <a:t>Refined Front-end</a:t>
-            </a:r>
-          </a:p>
-        </p:txBody>
-      </p:sp>
-      <p:pic>
-        <p:nvPicPr>
-          <p:cNvPr id="4" name="Content Placeholder 3" descr="A screenshot of a computer&#10;&#10;AI-generated content may be incorrect.">
-            <a:extLst>
-              <a:ext uri="{FF2B5EF4-FFF2-40B4-BE49-F238E27FC236}">
-                <a16:creationId xmlns:a16="http://schemas.microsoft.com/office/drawing/2014/main" id="{993C91D9-0133-FBC4-7D4A-683C4868CB51}"/>
-              </a:ext>
-            </a:extLst>
-          </p:cNvPr>
-          <p:cNvPicPr>
-            <a:picLocks noGrp="1" noChangeAspect="1"/>
-          </p:cNvPicPr>
-          <p:nvPr>
-            <p:ph idx="1"/>
-          </p:nvPr>
-        </p:nvPicPr>
-        <p:blipFill>
-          <a:blip r:embed="rId2"/>
-          <a:stretch>
-            <a:fillRect/>
-          </a:stretch>
-        </p:blipFill>
-        <p:spPr>
-          <a:xfrm>
-            <a:off x="221220" y="2811744"/>
-            <a:ext cx="5871717" cy="3510968"/>
-          </a:xfrm>
-        </p:spPr>
-      </p:pic>
-      <p:pic>
-        <p:nvPicPr>
-          <p:cNvPr id="5" name="Picture 4" descr="A screenshot of a computer&#10;&#10;AI-generated content may be incorrect.">
-            <a:extLst>
-              <a:ext uri="{FF2B5EF4-FFF2-40B4-BE49-F238E27FC236}">
-                <a16:creationId xmlns:a16="http://schemas.microsoft.com/office/drawing/2014/main" id="{B2BCAEF1-7767-1962-C831-31B89D968C8B}"/>
-              </a:ext>
-            </a:extLst>
-          </p:cNvPr>
-          <p:cNvPicPr>
-            <a:picLocks noChangeAspect="1"/>
-          </p:cNvPicPr>
-          <p:nvPr/>
-        </p:nvPicPr>
-        <p:blipFill>
-          <a:blip r:embed="rId3"/>
-          <a:stretch>
-            <a:fillRect/>
-          </a:stretch>
-        </p:blipFill>
-        <p:spPr>
-          <a:xfrm>
-            <a:off x="6261652" y="2813639"/>
-            <a:ext cx="5643219" cy="3516720"/>
-          </a:xfrm>
-          <a:prstGeom prst="rect">
-            <a:avLst/>
-          </a:prstGeom>
-        </p:spPr>
-      </p:pic>
-    </p:spTree>
-    <p:extLst>
-      <p:ext uri="{BB962C8B-B14F-4D97-AF65-F5344CB8AC3E}">
-        <p14:creationId xmlns:p14="http://schemas.microsoft.com/office/powerpoint/2010/main" val="40109320"/>
       </p:ext>
     </p:extLst>
   </p:cSld>

</xml_diff>

<commit_message>
Add diagram to presentation
</commit_message>
<xml_diff>
--- a/Phase 2 Documentation/Team_2_Presentation_2.pptx
+++ b/Phase 2 Documentation/Team_2_Presentation_2.pptx
@@ -14,7 +14,8 @@
     <p:sldId id="259" r:id="rId8"/>
     <p:sldId id="263" r:id="rId9"/>
     <p:sldId id="264" r:id="rId10"/>
-    <p:sldId id="266" r:id="rId11"/>
+    <p:sldId id="267" r:id="rId11"/>
+    <p:sldId id="266" r:id="rId12"/>
   </p:sldIdLst>
   <p:sldSz cx="12192000" cy="6858000"/>
   <p:notesSz cx="6858000" cy="9144000"/>
@@ -16060,6 +16061,99 @@
   <p:cSld>
     <p:spTree>
       <p:nvGrpSpPr>
+        <p:cNvPr id="1" name=""/>
+        <p:cNvGrpSpPr/>
+        <p:nvPr/>
+      </p:nvGrpSpPr>
+      <p:grpSpPr>
+        <a:xfrm>
+          <a:off x="0" y="0"/>
+          <a:ext cx="0" cy="0"/>
+          <a:chOff x="0" y="0"/>
+          <a:chExt cx="0" cy="0"/>
+        </a:xfrm>
+      </p:grpSpPr>
+      <p:sp>
+        <p:nvSpPr>
+          <p:cNvPr id="2" name="Title 1">
+            <a:extLst>
+              <a:ext uri="{FF2B5EF4-FFF2-40B4-BE49-F238E27FC236}">
+                <a16:creationId xmlns:a16="http://schemas.microsoft.com/office/drawing/2014/main" id="{44C988C5-2E60-91F0-9D1B-7CBFE4F15430}"/>
+              </a:ext>
+            </a:extLst>
+          </p:cNvPr>
+          <p:cNvSpPr>
+            <a:spLocks noGrp="1"/>
+          </p:cNvSpPr>
+          <p:nvPr>
+            <p:ph type="title"/>
+          </p:nvPr>
+        </p:nvSpPr>
+        <p:spPr/>
+        <p:txBody>
+          <a:bodyPr/>
+          <a:lstStyle/>
+          <a:p>
+            <a:r>
+              <a:rPr lang="en-US" dirty="0"/>
+              <a:t>User Note Entry Process</a:t>
+            </a:r>
+          </a:p>
+        </p:txBody>
+      </p:sp>
+      <p:pic>
+        <p:nvPicPr>
+          <p:cNvPr id="5" name="Content Placeholder 4" descr="A diagram of a encrypted note&#10;&#10;AI-generated content may be incorrect.">
+            <a:extLst>
+              <a:ext uri="{FF2B5EF4-FFF2-40B4-BE49-F238E27FC236}">
+                <a16:creationId xmlns:a16="http://schemas.microsoft.com/office/drawing/2014/main" id="{34665E4A-D471-75A9-19E7-067CF3BB6670}"/>
+              </a:ext>
+            </a:extLst>
+          </p:cNvPr>
+          <p:cNvPicPr>
+            <a:picLocks noGrp="1" noChangeAspect="1"/>
+          </p:cNvPicPr>
+          <p:nvPr>
+            <p:ph idx="1"/>
+          </p:nvPr>
+        </p:nvPicPr>
+        <p:blipFill>
+          <a:blip r:embed="rId2">
+            <a:extLst>
+              <a:ext uri="{28A0092B-C50C-407E-A947-70E740481C1C}">
+                <a14:useLocalDpi xmlns:a14="http://schemas.microsoft.com/office/drawing/2010/main" val="0"/>
+              </a:ext>
+            </a:extLst>
+          </a:blip>
+          <a:stretch>
+            <a:fillRect/>
+          </a:stretch>
+        </p:blipFill>
+        <p:spPr>
+          <a:xfrm>
+            <a:off x="40443" y="2715624"/>
+            <a:ext cx="12111114" cy="2529039"/>
+          </a:xfrm>
+        </p:spPr>
+      </p:pic>
+    </p:spTree>
+    <p:extLst>
+      <p:ext uri="{BB962C8B-B14F-4D97-AF65-F5344CB8AC3E}">
+        <p14:creationId xmlns:p14="http://schemas.microsoft.com/office/powerpoint/2010/main" val="605322467"/>
+      </p:ext>
+    </p:extLst>
+  </p:cSld>
+  <p:clrMapOvr>
+    <a:masterClrMapping/>
+  </p:clrMapOvr>
+</p:sld>
+</file>
+
+<file path=ppt/slides/slide11.xml><?xml version="1.0" encoding="utf-8"?>
+<p:sld xmlns:a="http://schemas.openxmlformats.org/drawingml/2006/main" xmlns:r="http://schemas.openxmlformats.org/officeDocument/2006/relationships" xmlns:p="http://schemas.openxmlformats.org/presentationml/2006/main">
+  <p:cSld>
+    <p:spTree>
+      <p:nvGrpSpPr>
         <p:cNvPr id="1" name="">
           <a:extLst>
             <a:ext uri="{FF2B5EF4-FFF2-40B4-BE49-F238E27FC236}">

</xml_diff>

<commit_message>
Fix that updates it back
Last time I had a huge update committed it. at least I thought, and saw that it broke the app. then reverted it, and lose all progress. So, I making sure this fine and correct and ACTUALLY committing it this time.
</commit_message>
<xml_diff>
--- a/Phase 2 Documentation/Team_2_Presentation_2.pptx
+++ b/Phase 2 Documentation/Team_2_Presentation_2.pptx
@@ -7,14 +7,15 @@
   <p:sldIdLst>
     <p:sldId id="256" r:id="rId2"/>
     <p:sldId id="257" r:id="rId3"/>
-    <p:sldId id="260" r:id="rId4"/>
-    <p:sldId id="261" r:id="rId5"/>
-    <p:sldId id="265" r:id="rId6"/>
+    <p:sldId id="265" r:id="rId4"/>
+    <p:sldId id="260" r:id="rId5"/>
+    <p:sldId id="261" r:id="rId6"/>
     <p:sldId id="262" r:id="rId7"/>
     <p:sldId id="259" r:id="rId8"/>
     <p:sldId id="263" r:id="rId9"/>
     <p:sldId id="264" r:id="rId10"/>
-    <p:sldId id="266" r:id="rId11"/>
+    <p:sldId id="267" r:id="rId11"/>
+    <p:sldId id="266" r:id="rId12"/>
   </p:sldIdLst>
   <p:sldSz cx="12192000" cy="6858000"/>
   <p:notesSz cx="6858000" cy="9144000"/>
@@ -8303,7 +8304,7 @@
           <a:p>
             <a:fld id="{40BFA2F5-D8EE-4C13-8817-1BE250F639AB}" type="datetimeFigureOut">
               <a:rPr lang="en-US" smtClean="0"/>
-              <a:t>3/9/2025</a:t>
+              <a:t>3/10/2025</a:t>
             </a:fld>
             <a:endParaRPr lang="en-US"/>
           </a:p>
@@ -8717,7 +8718,7 @@
           <a:p>
             <a:fld id="{40BFA2F5-D8EE-4C13-8817-1BE250F639AB}" type="datetimeFigureOut">
               <a:rPr lang="en-US" smtClean="0"/>
-              <a:t>3/9/2025</a:t>
+              <a:t>3/10/2025</a:t>
             </a:fld>
             <a:endParaRPr lang="en-US"/>
           </a:p>
@@ -9053,7 +9054,7 @@
           <a:p>
             <a:fld id="{40BFA2F5-D8EE-4C13-8817-1BE250F639AB}" type="datetimeFigureOut">
               <a:rPr lang="en-US" smtClean="0"/>
-              <a:t>3/9/2025</a:t>
+              <a:t>3/10/2025</a:t>
             </a:fld>
             <a:endParaRPr lang="en-US"/>
           </a:p>
@@ -9458,7 +9459,7 @@
           <a:p>
             <a:fld id="{40BFA2F5-D8EE-4C13-8817-1BE250F639AB}" type="datetimeFigureOut">
               <a:rPr lang="en-US" smtClean="0"/>
-              <a:t>3/9/2025</a:t>
+              <a:t>3/10/2025</a:t>
             </a:fld>
             <a:endParaRPr lang="en-US"/>
           </a:p>
@@ -10026,7 +10027,7 @@
           <a:p>
             <a:fld id="{40BFA2F5-D8EE-4C13-8817-1BE250F639AB}" type="datetimeFigureOut">
               <a:rPr lang="en-US" smtClean="0"/>
-              <a:t>3/9/2025</a:t>
+              <a:t>3/10/2025</a:t>
             </a:fld>
             <a:endParaRPr lang="en-US"/>
           </a:p>
@@ -10707,7 +10708,7 @@
           <a:p>
             <a:fld id="{40BFA2F5-D8EE-4C13-8817-1BE250F639AB}" type="datetimeFigureOut">
               <a:rPr lang="en-US" smtClean="0"/>
-              <a:t>3/9/2025</a:t>
+              <a:t>3/10/2025</a:t>
             </a:fld>
             <a:endParaRPr lang="en-US"/>
           </a:p>
@@ -11620,7 +11621,7 @@
           <a:p>
             <a:fld id="{40BFA2F5-D8EE-4C13-8817-1BE250F639AB}" type="datetimeFigureOut">
               <a:rPr lang="en-US" smtClean="0"/>
-              <a:t>3/9/2025</a:t>
+              <a:t>3/10/2025</a:t>
             </a:fld>
             <a:endParaRPr lang="en-US"/>
           </a:p>
@@ -11933,7 +11934,7 @@
           <a:p>
             <a:fld id="{40BFA2F5-D8EE-4C13-8817-1BE250F639AB}" type="datetimeFigureOut">
               <a:rPr lang="en-US" smtClean="0"/>
-              <a:t>3/9/2025</a:t>
+              <a:t>3/10/2025</a:t>
             </a:fld>
             <a:endParaRPr lang="en-US"/>
           </a:p>
@@ -12197,7 +12198,7 @@
           <a:p>
             <a:fld id="{40BFA2F5-D8EE-4C13-8817-1BE250F639AB}" type="datetimeFigureOut">
               <a:rPr lang="en-US" smtClean="0"/>
-              <a:t>3/9/2025</a:t>
+              <a:t>3/10/2025</a:t>
             </a:fld>
             <a:endParaRPr lang="en-US"/>
           </a:p>
@@ -12520,7 +12521,7 @@
           <a:p>
             <a:fld id="{40BFA2F5-D8EE-4C13-8817-1BE250F639AB}" type="datetimeFigureOut">
               <a:rPr lang="en-US" smtClean="0"/>
-              <a:t>3/9/2025</a:t>
+              <a:t>3/10/2025</a:t>
             </a:fld>
             <a:endParaRPr lang="en-US"/>
           </a:p>
@@ -12909,7 +12910,7 @@
           <a:p>
             <a:fld id="{40BFA2F5-D8EE-4C13-8817-1BE250F639AB}" type="datetimeFigureOut">
               <a:rPr lang="en-US" smtClean="0"/>
-              <a:t>3/9/2025</a:t>
+              <a:t>3/10/2025</a:t>
             </a:fld>
             <a:endParaRPr lang="en-US"/>
           </a:p>
@@ -13285,7 +13286,7 @@
           <a:p>
             <a:fld id="{40BFA2F5-D8EE-4C13-8817-1BE250F639AB}" type="datetimeFigureOut">
               <a:rPr lang="en-US" smtClean="0"/>
-              <a:t>3/9/2025</a:t>
+              <a:t>3/10/2025</a:t>
             </a:fld>
             <a:endParaRPr lang="en-US"/>
           </a:p>
@@ -13791,7 +13792,7 @@
           <a:p>
             <a:fld id="{40BFA2F5-D8EE-4C13-8817-1BE250F639AB}" type="datetimeFigureOut">
               <a:rPr lang="en-US" smtClean="0"/>
-              <a:t>3/9/2025</a:t>
+              <a:t>3/10/2025</a:t>
             </a:fld>
             <a:endParaRPr lang="en-US"/>
           </a:p>
@@ -14048,7 +14049,7 @@
           <a:p>
             <a:fld id="{40BFA2F5-D8EE-4C13-8817-1BE250F639AB}" type="datetimeFigureOut">
               <a:rPr lang="en-US" smtClean="0"/>
-              <a:t>3/9/2025</a:t>
+              <a:t>3/10/2025</a:t>
             </a:fld>
             <a:endParaRPr lang="en-US"/>
           </a:p>
@@ -14211,7 +14212,7 @@
           <a:p>
             <a:fld id="{40BFA2F5-D8EE-4C13-8817-1BE250F639AB}" type="datetimeFigureOut">
               <a:rPr lang="en-US" smtClean="0"/>
-              <a:t>3/9/2025</a:t>
+              <a:t>3/10/2025</a:t>
             </a:fld>
             <a:endParaRPr lang="en-US"/>
           </a:p>
@@ -14601,7 +14602,7 @@
           <a:p>
             <a:fld id="{40BFA2F5-D8EE-4C13-8817-1BE250F639AB}" type="datetimeFigureOut">
               <a:rPr lang="en-US" smtClean="0"/>
-              <a:t>3/9/2025</a:t>
+              <a:t>3/10/2025</a:t>
             </a:fld>
             <a:endParaRPr lang="en-US"/>
           </a:p>
@@ -15010,7 +15011,7 @@
           <a:p>
             <a:fld id="{40BFA2F5-D8EE-4C13-8817-1BE250F639AB}" type="datetimeFigureOut">
               <a:rPr lang="en-US" smtClean="0"/>
-              <a:t>3/9/2025</a:t>
+              <a:t>3/10/2025</a:t>
             </a:fld>
             <a:endParaRPr lang="en-US"/>
           </a:p>
@@ -15254,7 +15255,7 @@
           <a:p>
             <a:fld id="{40BFA2F5-D8EE-4C13-8817-1BE250F639AB}" type="datetimeFigureOut">
               <a:rPr lang="en-US" smtClean="0"/>
-              <a:t>3/9/2025</a:t>
+              <a:t>3/10/2025</a:t>
             </a:fld>
             <a:endParaRPr lang="en-US"/>
           </a:p>
@@ -15934,32 +15935,48 @@
           <a:lstStyle/>
           <a:p>
             <a:r>
-              <a:rPr lang="en-US" sz="2800" i="1">
+              <a:rPr lang="en-US" sz="2800" i="1" dirty="0">
                 <a:solidFill>
                   <a:srgbClr val="FFFFFF"/>
                 </a:solidFill>
               </a:rPr>
-              <a:t>Phase2</a:t>
+              <a:t>Phase 2</a:t>
             </a:r>
           </a:p>
           <a:p>
             <a:r>
-              <a:rPr lang="en-US" sz="2800">
+              <a:rPr lang="en-US" sz="2800" dirty="0">
                 <a:solidFill>
                   <a:srgbClr val="FFFFFF"/>
                 </a:solidFill>
               </a:rPr>
-              <a:t>Team2</a:t>
+              <a:t>Team 2</a:t>
             </a:r>
           </a:p>
           <a:p>
             <a:r>
-              <a:rPr lang="en-US" sz="2800">
+              <a:rPr lang="en-US" sz="2800" dirty="0">
                 <a:solidFill>
                   <a:srgbClr val="FFFFFF"/>
                 </a:solidFill>
               </a:rPr>
-              <a:t>Duncan, Kurejake, Jacob, Grant, Kaden</a:t>
+              <a:t>Duncan, </a:t>
+            </a:r>
+            <a:r>
+              <a:rPr lang="en-US" sz="2800" dirty="0" err="1">
+                <a:solidFill>
+                  <a:srgbClr val="FFFFFF"/>
+                </a:solidFill>
+              </a:rPr>
+              <a:t>Kurejake</a:t>
+            </a:r>
+            <a:r>
+              <a:rPr lang="en-US" sz="2800" dirty="0">
+                <a:solidFill>
+                  <a:srgbClr val="FFFFFF"/>
+                </a:solidFill>
+              </a:rPr>
+              <a:t>, Jacob, Grant, Kaden</a:t>
             </a:r>
           </a:p>
         </p:txBody>
@@ -16044,6 +16061,99 @@
   <p:cSld>
     <p:spTree>
       <p:nvGrpSpPr>
+        <p:cNvPr id="1" name=""/>
+        <p:cNvGrpSpPr/>
+        <p:nvPr/>
+      </p:nvGrpSpPr>
+      <p:grpSpPr>
+        <a:xfrm>
+          <a:off x="0" y="0"/>
+          <a:ext cx="0" cy="0"/>
+          <a:chOff x="0" y="0"/>
+          <a:chExt cx="0" cy="0"/>
+        </a:xfrm>
+      </p:grpSpPr>
+      <p:sp>
+        <p:nvSpPr>
+          <p:cNvPr id="2" name="Title 1">
+            <a:extLst>
+              <a:ext uri="{FF2B5EF4-FFF2-40B4-BE49-F238E27FC236}">
+                <a16:creationId xmlns:a16="http://schemas.microsoft.com/office/drawing/2014/main" id="{44C988C5-2E60-91F0-9D1B-7CBFE4F15430}"/>
+              </a:ext>
+            </a:extLst>
+          </p:cNvPr>
+          <p:cNvSpPr>
+            <a:spLocks noGrp="1"/>
+          </p:cNvSpPr>
+          <p:nvPr>
+            <p:ph type="title"/>
+          </p:nvPr>
+        </p:nvSpPr>
+        <p:spPr/>
+        <p:txBody>
+          <a:bodyPr/>
+          <a:lstStyle/>
+          <a:p>
+            <a:r>
+              <a:rPr lang="en-US" dirty="0"/>
+              <a:t>User Note Entry Process</a:t>
+            </a:r>
+          </a:p>
+        </p:txBody>
+      </p:sp>
+      <p:pic>
+        <p:nvPicPr>
+          <p:cNvPr id="5" name="Content Placeholder 4" descr="A diagram of a encrypted note&#10;&#10;AI-generated content may be incorrect.">
+            <a:extLst>
+              <a:ext uri="{FF2B5EF4-FFF2-40B4-BE49-F238E27FC236}">
+                <a16:creationId xmlns:a16="http://schemas.microsoft.com/office/drawing/2014/main" id="{34665E4A-D471-75A9-19E7-067CF3BB6670}"/>
+              </a:ext>
+            </a:extLst>
+          </p:cNvPr>
+          <p:cNvPicPr>
+            <a:picLocks noGrp="1" noChangeAspect="1"/>
+          </p:cNvPicPr>
+          <p:nvPr>
+            <p:ph idx="1"/>
+          </p:nvPr>
+        </p:nvPicPr>
+        <p:blipFill>
+          <a:blip r:embed="rId2">
+            <a:extLst>
+              <a:ext uri="{28A0092B-C50C-407E-A947-70E740481C1C}">
+                <a14:useLocalDpi xmlns:a14="http://schemas.microsoft.com/office/drawing/2010/main" val="0"/>
+              </a:ext>
+            </a:extLst>
+          </a:blip>
+          <a:stretch>
+            <a:fillRect/>
+          </a:stretch>
+        </p:blipFill>
+        <p:spPr>
+          <a:xfrm>
+            <a:off x="40443" y="2715624"/>
+            <a:ext cx="12111114" cy="2529039"/>
+          </a:xfrm>
+        </p:spPr>
+      </p:pic>
+    </p:spTree>
+    <p:extLst>
+      <p:ext uri="{BB962C8B-B14F-4D97-AF65-F5344CB8AC3E}">
+        <p14:creationId xmlns:p14="http://schemas.microsoft.com/office/powerpoint/2010/main" val="605322467"/>
+      </p:ext>
+    </p:extLst>
+  </p:cSld>
+  <p:clrMapOvr>
+    <a:masterClrMapping/>
+  </p:clrMapOvr>
+</p:sld>
+</file>
+
+<file path=ppt/slides/slide11.xml><?xml version="1.0" encoding="utf-8"?>
+<p:sld xmlns:a="http://schemas.openxmlformats.org/drawingml/2006/main" xmlns:r="http://schemas.openxmlformats.org/officeDocument/2006/relationships" xmlns:p="http://schemas.openxmlformats.org/presentationml/2006/main">
+  <p:cSld>
+    <p:spTree>
+      <p:nvGrpSpPr>
         <p:cNvPr id="1" name="">
           <a:extLst>
             <a:ext uri="{FF2B5EF4-FFF2-40B4-BE49-F238E27FC236}">
@@ -16083,7 +16193,10 @@
           <a:bodyPr/>
           <a:lstStyle/>
           <a:p>
-            <a:endParaRPr lang="en-US"/>
+            <a:r>
+              <a:rPr lang="en-US" dirty="0"/>
+              <a:t>Questions?</a:t>
+            </a:r>
           </a:p>
         </p:txBody>
       </p:sp>
@@ -16637,6 +16750,142 @@
 <file path=ppt/slides/slide3.xml><?xml version="1.0" encoding="utf-8"?>
 <p:sld xmlns:a="http://schemas.openxmlformats.org/drawingml/2006/main" xmlns:r="http://schemas.openxmlformats.org/officeDocument/2006/relationships" xmlns:p="http://schemas.openxmlformats.org/presentationml/2006/main">
   <p:cSld>
+    <p:spTree>
+      <p:nvGrpSpPr>
+        <p:cNvPr id="1" name="">
+          <a:extLst>
+            <a:ext uri="{FF2B5EF4-FFF2-40B4-BE49-F238E27FC236}">
+              <a16:creationId xmlns:a16="http://schemas.microsoft.com/office/drawing/2014/main" id="{CC27D892-C42E-E633-F475-930F3F6A0D49}"/>
+            </a:ext>
+          </a:extLst>
+        </p:cNvPr>
+        <p:cNvGrpSpPr/>
+        <p:nvPr/>
+      </p:nvGrpSpPr>
+      <p:grpSpPr>
+        <a:xfrm>
+          <a:off x="0" y="0"/>
+          <a:ext cx="0" cy="0"/>
+          <a:chOff x="0" y="0"/>
+          <a:chExt cx="0" cy="0"/>
+        </a:xfrm>
+      </p:grpSpPr>
+      <p:sp>
+        <p:nvSpPr>
+          <p:cNvPr id="2" name="Title 1">
+            <a:extLst>
+              <a:ext uri="{FF2B5EF4-FFF2-40B4-BE49-F238E27FC236}">
+                <a16:creationId xmlns:a16="http://schemas.microsoft.com/office/drawing/2014/main" id="{591B2511-AC71-BC7A-D4A3-D7F0CE6603F6}"/>
+              </a:ext>
+            </a:extLst>
+          </p:cNvPr>
+          <p:cNvSpPr>
+            <a:spLocks noGrp="1"/>
+          </p:cNvSpPr>
+          <p:nvPr>
+            <p:ph type="title"/>
+          </p:nvPr>
+        </p:nvSpPr>
+        <p:spPr/>
+        <p:txBody>
+          <a:bodyPr/>
+          <a:lstStyle/>
+          <a:p>
+            <a:r>
+              <a:rPr lang="en-US" dirty="0"/>
+              <a:t>Current Front-end</a:t>
+            </a:r>
+          </a:p>
+        </p:txBody>
+      </p:sp>
+      <p:pic>
+        <p:nvPicPr>
+          <p:cNvPr id="6" name="Picture 5" descr="A screenshot of a computer&#10;&#10;AI-generated content may be incorrect.">
+            <a:extLst>
+              <a:ext uri="{FF2B5EF4-FFF2-40B4-BE49-F238E27FC236}">
+                <a16:creationId xmlns:a16="http://schemas.microsoft.com/office/drawing/2014/main" id="{F33971A1-55D1-03E6-1CA9-B0CD190C0144}"/>
+              </a:ext>
+            </a:extLst>
+          </p:cNvPr>
+          <p:cNvPicPr>
+            <a:picLocks noChangeAspect="1"/>
+          </p:cNvPicPr>
+          <p:nvPr/>
+        </p:nvPicPr>
+        <p:blipFill>
+          <a:blip r:embed="rId2">
+            <a:extLst>
+              <a:ext uri="{28A0092B-C50C-407E-A947-70E740481C1C}">
+                <a14:useLocalDpi xmlns:a14="http://schemas.microsoft.com/office/drawing/2010/main" val="0"/>
+              </a:ext>
+            </a:extLst>
+          </a:blip>
+          <a:stretch>
+            <a:fillRect/>
+          </a:stretch>
+        </p:blipFill>
+        <p:spPr>
+          <a:xfrm>
+            <a:off x="287129" y="2586157"/>
+            <a:ext cx="5643220" cy="3518615"/>
+          </a:xfrm>
+          <a:prstGeom prst="rect">
+            <a:avLst/>
+          </a:prstGeom>
+        </p:spPr>
+      </p:pic>
+      <p:pic>
+        <p:nvPicPr>
+          <p:cNvPr id="8" name="Picture 7" descr="A screenshot of a computer&#10;&#10;AI-generated content may be incorrect.">
+            <a:extLst>
+              <a:ext uri="{FF2B5EF4-FFF2-40B4-BE49-F238E27FC236}">
+                <a16:creationId xmlns:a16="http://schemas.microsoft.com/office/drawing/2014/main" id="{69B920AB-4556-B5B7-C57F-2E64D9013DF5}"/>
+              </a:ext>
+            </a:extLst>
+          </p:cNvPr>
+          <p:cNvPicPr>
+            <a:picLocks noChangeAspect="1"/>
+          </p:cNvPicPr>
+          <p:nvPr/>
+        </p:nvPicPr>
+        <p:blipFill>
+          <a:blip r:embed="rId3">
+            <a:extLst>
+              <a:ext uri="{28A0092B-C50C-407E-A947-70E740481C1C}">
+                <a14:useLocalDpi xmlns:a14="http://schemas.microsoft.com/office/drawing/2010/main" val="0"/>
+              </a:ext>
+            </a:extLst>
+          </a:blip>
+          <a:stretch>
+            <a:fillRect/>
+          </a:stretch>
+        </p:blipFill>
+        <p:spPr>
+          <a:xfrm>
+            <a:off x="6261652" y="2586157"/>
+            <a:ext cx="5643219" cy="3518615"/>
+          </a:xfrm>
+          <a:prstGeom prst="rect">
+            <a:avLst/>
+          </a:prstGeom>
+        </p:spPr>
+      </p:pic>
+    </p:spTree>
+    <p:extLst>
+      <p:ext uri="{BB962C8B-B14F-4D97-AF65-F5344CB8AC3E}">
+        <p14:creationId xmlns:p14="http://schemas.microsoft.com/office/powerpoint/2010/main" val="40109320"/>
+      </p:ext>
+    </p:extLst>
+  </p:cSld>
+  <p:clrMapOvr>
+    <a:masterClrMapping/>
+  </p:clrMapOvr>
+</p:sld>
+</file>
+
+<file path=ppt/slides/slide4.xml><?xml version="1.0" encoding="utf-8"?>
+<p:sld xmlns:a="http://schemas.openxmlformats.org/drawingml/2006/main" xmlns:r="http://schemas.openxmlformats.org/officeDocument/2006/relationships" xmlns:p="http://schemas.openxmlformats.org/presentationml/2006/main">
+  <p:cSld>
     <p:bg>
       <p:bgPr>
         <a:gradFill rotWithShape="1">
@@ -17048,7 +17297,7 @@
 </p:sld>
 </file>
 
-<file path=ppt/slides/slide4.xml><?xml version="1.0" encoding="utf-8"?>
+<file path=ppt/slides/slide5.xml><?xml version="1.0" encoding="utf-8"?>
 <p:sld xmlns:a="http://schemas.openxmlformats.org/drawingml/2006/main" xmlns:r="http://schemas.openxmlformats.org/officeDocument/2006/relationships" xmlns:p="http://schemas.openxmlformats.org/presentationml/2006/main">
   <p:cSld>
     <p:spTree>
@@ -17147,129 +17396,6 @@
 </p:sld>
 </file>
 
-<file path=ppt/slides/slide5.xml><?xml version="1.0" encoding="utf-8"?>
-<p:sld xmlns:a="http://schemas.openxmlformats.org/drawingml/2006/main" xmlns:r="http://schemas.openxmlformats.org/officeDocument/2006/relationships" xmlns:p="http://schemas.openxmlformats.org/presentationml/2006/main">
-  <p:cSld>
-    <p:spTree>
-      <p:nvGrpSpPr>
-        <p:cNvPr id="1" name="">
-          <a:extLst>
-            <a:ext uri="{FF2B5EF4-FFF2-40B4-BE49-F238E27FC236}">
-              <a16:creationId xmlns:a16="http://schemas.microsoft.com/office/drawing/2014/main" id="{CC27D892-C42E-E633-F475-930F3F6A0D49}"/>
-            </a:ext>
-          </a:extLst>
-        </p:cNvPr>
-        <p:cNvGrpSpPr/>
-        <p:nvPr/>
-      </p:nvGrpSpPr>
-      <p:grpSpPr>
-        <a:xfrm>
-          <a:off x="0" y="0"/>
-          <a:ext cx="0" cy="0"/>
-          <a:chOff x="0" y="0"/>
-          <a:chExt cx="0" cy="0"/>
-        </a:xfrm>
-      </p:grpSpPr>
-      <p:sp>
-        <p:nvSpPr>
-          <p:cNvPr id="2" name="Title 1">
-            <a:extLst>
-              <a:ext uri="{FF2B5EF4-FFF2-40B4-BE49-F238E27FC236}">
-                <a16:creationId xmlns:a16="http://schemas.microsoft.com/office/drawing/2014/main" id="{591B2511-AC71-BC7A-D4A3-D7F0CE6603F6}"/>
-              </a:ext>
-            </a:extLst>
-          </p:cNvPr>
-          <p:cNvSpPr>
-            <a:spLocks noGrp="1"/>
-          </p:cNvSpPr>
-          <p:nvPr>
-            <p:ph type="title"/>
-          </p:nvPr>
-        </p:nvSpPr>
-        <p:spPr/>
-        <p:txBody>
-          <a:bodyPr/>
-          <a:lstStyle/>
-          <a:p>
-            <a:r>
-              <a:rPr lang="en-US" dirty="0"/>
-              <a:t>Refined Front-end</a:t>
-            </a:r>
-          </a:p>
-        </p:txBody>
-      </p:sp>
-      <p:pic>
-        <p:nvPicPr>
-          <p:cNvPr id="4" name="Content Placeholder 3" descr="A screenshot of a computer&#10;&#10;AI-generated content may be incorrect.">
-            <a:extLst>
-              <a:ext uri="{FF2B5EF4-FFF2-40B4-BE49-F238E27FC236}">
-                <a16:creationId xmlns:a16="http://schemas.microsoft.com/office/drawing/2014/main" id="{993C91D9-0133-FBC4-7D4A-683C4868CB51}"/>
-              </a:ext>
-            </a:extLst>
-          </p:cNvPr>
-          <p:cNvPicPr>
-            <a:picLocks noGrp="1" noChangeAspect="1"/>
-          </p:cNvPicPr>
-          <p:nvPr>
-            <p:ph idx="1"/>
-          </p:nvPr>
-        </p:nvPicPr>
-        <p:blipFill>
-          <a:blip r:embed="rId2"/>
-          <a:stretch>
-            <a:fillRect/>
-          </a:stretch>
-        </p:blipFill>
-        <p:spPr>
-          <a:xfrm>
-            <a:off x="221220" y="2811744"/>
-            <a:ext cx="5871717" cy="3510968"/>
-          </a:xfrm>
-        </p:spPr>
-      </p:pic>
-      <p:pic>
-        <p:nvPicPr>
-          <p:cNvPr id="5" name="Picture 4" descr="A screenshot of a computer&#10;&#10;AI-generated content may be incorrect.">
-            <a:extLst>
-              <a:ext uri="{FF2B5EF4-FFF2-40B4-BE49-F238E27FC236}">
-                <a16:creationId xmlns:a16="http://schemas.microsoft.com/office/drawing/2014/main" id="{B2BCAEF1-7767-1962-C831-31B89D968C8B}"/>
-              </a:ext>
-            </a:extLst>
-          </p:cNvPr>
-          <p:cNvPicPr>
-            <a:picLocks noChangeAspect="1"/>
-          </p:cNvPicPr>
-          <p:nvPr/>
-        </p:nvPicPr>
-        <p:blipFill>
-          <a:blip r:embed="rId3"/>
-          <a:stretch>
-            <a:fillRect/>
-          </a:stretch>
-        </p:blipFill>
-        <p:spPr>
-          <a:xfrm>
-            <a:off x="6261652" y="2813639"/>
-            <a:ext cx="5643219" cy="3516720"/>
-          </a:xfrm>
-          <a:prstGeom prst="rect">
-            <a:avLst/>
-          </a:prstGeom>
-        </p:spPr>
-      </p:pic>
-    </p:spTree>
-    <p:extLst>
-      <p:ext uri="{BB962C8B-B14F-4D97-AF65-F5344CB8AC3E}">
-        <p14:creationId xmlns:p14="http://schemas.microsoft.com/office/powerpoint/2010/main" val="40109320"/>
-      </p:ext>
-    </p:extLst>
-  </p:cSld>
-  <p:clrMapOvr>
-    <a:masterClrMapping/>
-  </p:clrMapOvr>
-</p:sld>
-</file>
-
 <file path=ppt/slides/slide6.xml><?xml version="1.0" encoding="utf-8"?>
 <p:sld xmlns:a="http://schemas.openxmlformats.org/drawingml/2006/main" xmlns:r="http://schemas.openxmlformats.org/officeDocument/2006/relationships" xmlns:p="http://schemas.openxmlformats.org/presentationml/2006/main">
   <p:cSld>
@@ -17348,6 +17474,24 @@
             <a:normAutofit/>
           </a:bodyPr>
           <a:lstStyle/>
+          <a:p>
+            <a:r>
+              <a:rPr lang="en-US" dirty="0"/>
+              <a:t>Google Drive API</a:t>
+            </a:r>
+          </a:p>
+          <a:p>
+            <a:r>
+              <a:rPr lang="en-US" dirty="0"/>
+              <a:t>Google Sign-In API</a:t>
+            </a:r>
+          </a:p>
+          <a:p>
+            <a:r>
+              <a:rPr lang="en-US" dirty="0"/>
+              <a:t>Google Cloud Secret Manager (possible)</a:t>
+            </a:r>
+          </a:p>
           <a:p>
             <a:endParaRPr lang="en-US" dirty="0"/>
           </a:p>

</xml_diff>

<commit_message>
Updated the Presentation to show Updated app
</commit_message>
<xml_diff>
--- a/Phase 2 Documentation/Team_2_Presentation_2.pptx
+++ b/Phase 2 Documentation/Team_2_Presentation_2.pptx
@@ -2481,7 +2481,7 @@
 <dgm:dataModel xmlns:dgm="http://schemas.openxmlformats.org/drawingml/2006/diagram" xmlns:a="http://schemas.openxmlformats.org/drawingml/2006/main">
   <dgm:ptLst>
     <dgm:pt modelId="{2A2534A5-79A8-469B-A0AE-5988A0A1F6D8}" type="doc">
-      <dgm:prSet loTypeId="urn:microsoft.com/office/officeart/2008/layout/LinedList" loCatId="list" qsTypeId="urn:microsoft.com/office/officeart/2005/8/quickstyle/simple5" qsCatId="simple" csTypeId="urn:microsoft.com/office/officeart/2005/8/colors/colorful2" csCatId="colorful"/>
+      <dgm:prSet loTypeId="urn:microsoft.com/office/officeart/2008/layout/LinedList" loCatId="list" qsTypeId="urn:microsoft.com/office/officeart/2005/8/quickstyle/simple5" qsCatId="simple" csTypeId="urn:microsoft.com/office/officeart/2005/8/colors/colorful2" csCatId="colorful" phldr="1"/>
       <dgm:spPr/>
       <dgm:t>
         <a:bodyPr/>
@@ -2506,7 +2506,7 @@
           </a:r>
           <a:r>
             <a:rPr lang="en-US" dirty="0"/>
-            <a:t> added all documents templates to the GitHub</a:t>
+            <a:t> added all documents templates to the GitHub and then renamed them</a:t>
           </a:r>
         </a:p>
       </dgm:t>
@@ -2542,7 +2542,7 @@
         <a:p>
           <a:r>
             <a:rPr lang="en-US" dirty="0"/>
-            <a:t>Then we all later started to add pieces what we did and completed parts of the documents</a:t>
+            <a:t>Then we all later started to add pieces what of we did and completed parts of the documents</a:t>
           </a:r>
         </a:p>
       </dgm:t>
@@ -3202,7 +3202,7 @@
           </a:r>
           <a:r>
             <a:rPr lang="en-US" sz="2600" kern="1200" dirty="0"/>
-            <a:t> added all documents templates to the GitHub</a:t>
+            <a:t> added all documents templates to the GitHub and then renamed them</a:t>
           </a:r>
         </a:p>
       </dsp:txBody>
@@ -3347,7 +3347,7 @@
           </a:pPr>
           <a:r>
             <a:rPr lang="en-US" sz="2600" kern="1200" dirty="0"/>
-            <a:t>Then we all later started to add pieces what we did and completed parts of the documents</a:t>
+            <a:t>Then we all later started to add pieces what of we did and completed parts of the documents</a:t>
           </a:r>
         </a:p>
       </dsp:txBody>
@@ -16772,6 +16772,59 @@
       </p:grpSpPr>
       <p:sp>
         <p:nvSpPr>
+          <p:cNvPr id="9" name="Rectangle 8">
+            <a:extLst>
+              <a:ext uri="{FF2B5EF4-FFF2-40B4-BE49-F238E27FC236}">
+                <a16:creationId xmlns:a16="http://schemas.microsoft.com/office/drawing/2014/main" id="{787CFA08-73BE-FA94-35C9-C319746642E5}"/>
+              </a:ext>
+            </a:extLst>
+          </p:cNvPr>
+          <p:cNvSpPr/>
+          <p:nvPr/>
+        </p:nvSpPr>
+        <p:spPr>
+          <a:xfrm>
+            <a:off x="186612" y="65314"/>
+            <a:ext cx="6083559" cy="1073021"/>
+          </a:xfrm>
+          <a:prstGeom prst="rect">
+            <a:avLst/>
+          </a:prstGeom>
+          <a:effectLst>
+            <a:outerShdw blurRad="50800" dist="38100" dir="2700000" algn="tl" rotWithShape="0">
+              <a:prstClr val="black">
+                <a:alpha val="40000"/>
+              </a:prstClr>
+            </a:outerShdw>
+          </a:effectLst>
+        </p:spPr>
+        <p:style>
+          <a:lnRef idx="2">
+            <a:schemeClr val="dk1">
+              <a:shade val="15000"/>
+            </a:schemeClr>
+          </a:lnRef>
+          <a:fillRef idx="1">
+            <a:schemeClr val="dk1"/>
+          </a:fillRef>
+          <a:effectRef idx="0">
+            <a:schemeClr val="dk1"/>
+          </a:effectRef>
+          <a:fontRef idx="minor">
+            <a:schemeClr val="lt1"/>
+          </a:fontRef>
+        </p:style>
+        <p:txBody>
+          <a:bodyPr rtlCol="0" anchor="ctr"/>
+          <a:lstStyle/>
+          <a:p>
+            <a:pPr algn="ctr"/>
+            <a:endParaRPr lang="en-US"/>
+          </a:p>
+        </p:txBody>
+      </p:sp>
+      <p:sp>
+        <p:nvSpPr>
           <p:cNvPr id="2" name="Title 1">
             <a:extLst>
               <a:ext uri="{FF2B5EF4-FFF2-40B4-BE49-F238E27FC236}">
@@ -16783,17 +16836,22 @@
             <a:spLocks noGrp="1"/>
           </p:cNvSpPr>
           <p:nvPr>
-            <p:ph type="title"/>
+            <p:ph type="title" idx="4294967295"/>
           </p:nvPr>
         </p:nvSpPr>
-        <p:spPr/>
+        <p:spPr>
+          <a:xfrm>
+            <a:off x="212919" y="65314"/>
+            <a:ext cx="9613900" cy="1081088"/>
+          </a:xfrm>
+        </p:spPr>
         <p:txBody>
           <a:bodyPr/>
           <a:lstStyle/>
           <a:p>
             <a:r>
               <a:rPr lang="en-US" dirty="0"/>
-              <a:t>Current Front-end</a:t>
+              <a:t>Current and Past Front-end</a:t>
             </a:r>
           </a:p>
         </p:txBody>
@@ -16826,8 +16884,8 @@
         </p:blipFill>
         <p:spPr>
           <a:xfrm>
-            <a:off x="287129" y="2586157"/>
-            <a:ext cx="5643220" cy="3518615"/>
+            <a:off x="6400628" y="541177"/>
+            <a:ext cx="4631546" cy="2887824"/>
           </a:xfrm>
           <a:prstGeom prst="rect">
             <a:avLst/>
@@ -16862,14 +16920,127 @@
         </p:blipFill>
         <p:spPr>
           <a:xfrm>
-            <a:off x="6261652" y="2586157"/>
-            <a:ext cx="5643219" cy="3518615"/>
+            <a:off x="5660952" y="3429000"/>
+            <a:ext cx="5371221" cy="3349021"/>
           </a:xfrm>
           <a:prstGeom prst="rect">
             <a:avLst/>
           </a:prstGeom>
         </p:spPr>
       </p:pic>
+      <p:pic>
+        <p:nvPicPr>
+          <p:cNvPr id="4" name="Picture 3">
+            <a:extLst>
+              <a:ext uri="{FF2B5EF4-FFF2-40B4-BE49-F238E27FC236}">
+                <a16:creationId xmlns:a16="http://schemas.microsoft.com/office/drawing/2014/main" id="{71D1837B-AD5D-83BA-4247-BE9239738FC6}"/>
+              </a:ext>
+            </a:extLst>
+          </p:cNvPr>
+          <p:cNvPicPr>
+            <a:picLocks noChangeAspect="1"/>
+          </p:cNvPicPr>
+          <p:nvPr/>
+        </p:nvPicPr>
+        <p:blipFill>
+          <a:blip r:embed="rId4"/>
+          <a:stretch>
+            <a:fillRect/>
+          </a:stretch>
+        </p:blipFill>
+        <p:spPr>
+          <a:xfrm>
+            <a:off x="433891" y="1228598"/>
+            <a:ext cx="4949871" cy="2782044"/>
+          </a:xfrm>
+          <a:prstGeom prst="rect">
+            <a:avLst/>
+          </a:prstGeom>
+        </p:spPr>
+      </p:pic>
+      <p:pic>
+        <p:nvPicPr>
+          <p:cNvPr id="7" name="Picture 6">
+            <a:extLst>
+              <a:ext uri="{FF2B5EF4-FFF2-40B4-BE49-F238E27FC236}">
+                <a16:creationId xmlns:a16="http://schemas.microsoft.com/office/drawing/2014/main" id="{1DBC53DB-1832-71C4-D410-488CA7348926}"/>
+              </a:ext>
+            </a:extLst>
+          </p:cNvPr>
+          <p:cNvPicPr>
+            <a:picLocks noChangeAspect="1"/>
+          </p:cNvPicPr>
+          <p:nvPr/>
+        </p:nvPicPr>
+        <p:blipFill>
+          <a:blip r:embed="rId5"/>
+          <a:stretch>
+            <a:fillRect/>
+          </a:stretch>
+        </p:blipFill>
+        <p:spPr>
+          <a:xfrm>
+            <a:off x="433892" y="4010642"/>
+            <a:ext cx="4949871" cy="2782044"/>
+          </a:xfrm>
+          <a:prstGeom prst="rect">
+            <a:avLst/>
+          </a:prstGeom>
+        </p:spPr>
+      </p:pic>
+      <p:sp>
+        <p:nvSpPr>
+          <p:cNvPr id="10" name="Arrow: Left 9">
+            <a:extLst>
+              <a:ext uri="{FF2B5EF4-FFF2-40B4-BE49-F238E27FC236}">
+                <a16:creationId xmlns:a16="http://schemas.microsoft.com/office/drawing/2014/main" id="{043CA8C8-9721-74CA-47C8-2BFEB7CE7E55}"/>
+              </a:ext>
+            </a:extLst>
+          </p:cNvPr>
+          <p:cNvSpPr/>
+          <p:nvPr/>
+        </p:nvSpPr>
+        <p:spPr>
+          <a:xfrm>
+            <a:off x="5490978" y="1946373"/>
+            <a:ext cx="802434" cy="682656"/>
+          </a:xfrm>
+          <a:prstGeom prst="leftArrow">
+            <a:avLst/>
+          </a:prstGeom>
+          <a:effectLst>
+            <a:outerShdw blurRad="50800" dist="38100" dir="2700000" algn="tl" rotWithShape="0">
+              <a:prstClr val="black">
+                <a:alpha val="40000"/>
+              </a:prstClr>
+            </a:outerShdw>
+          </a:effectLst>
+        </p:spPr>
+        <p:style>
+          <a:lnRef idx="2">
+            <a:schemeClr val="dk1">
+              <a:shade val="15000"/>
+            </a:schemeClr>
+          </a:lnRef>
+          <a:fillRef idx="1">
+            <a:schemeClr val="dk1"/>
+          </a:fillRef>
+          <a:effectRef idx="0">
+            <a:schemeClr val="dk1"/>
+          </a:effectRef>
+          <a:fontRef idx="minor">
+            <a:schemeClr val="lt1"/>
+          </a:fontRef>
+        </p:style>
+        <p:txBody>
+          <a:bodyPr rtlCol="0" anchor="ctr"/>
+          <a:lstStyle/>
+          <a:p>
+            <a:pPr algn="ctr"/>
+            <a:endParaRPr lang="en-US"/>
+          </a:p>
+        </p:txBody>
+      </p:sp>
     </p:spTree>
     <p:extLst>
       <p:ext uri="{BB962C8B-B14F-4D97-AF65-F5344CB8AC3E}">
@@ -17269,7 +17440,7 @@
             <p:ph idx="1"/>
             <p:extLst>
               <p:ext uri="{D42A27DB-BD31-4B8C-83A1-F6EECF244321}">
-                <p14:modId xmlns:p14="http://schemas.microsoft.com/office/powerpoint/2010/main" val="3927334732"/>
+                <p14:modId xmlns:p14="http://schemas.microsoft.com/office/powerpoint/2010/main" val="2161123247"/>
               </p:ext>
             </p:extLst>
           </p:nvPr>

</xml_diff>

<commit_message>
changed phase 2 ppt
</commit_message>
<xml_diff>
--- a/Phase 2 Documentation/Team_2_Presentation_2.pptx
+++ b/Phase 2 Documentation/Team_2_Presentation_2.pptx
@@ -16884,8 +16884,8 @@
         </p:blipFill>
         <p:spPr>
           <a:xfrm>
-            <a:off x="6400628" y="541177"/>
-            <a:ext cx="4631546" cy="2887824"/>
+            <a:off x="659786" y="1242532"/>
+            <a:ext cx="4108128" cy="2561467"/>
           </a:xfrm>
           <a:prstGeom prst="rect">
             <a:avLst/>
@@ -16920,8 +16920,8 @@
         </p:blipFill>
         <p:spPr>
           <a:xfrm>
-            <a:off x="5660952" y="3429000"/>
-            <a:ext cx="5371221" cy="3349021"/>
+            <a:off x="659786" y="4130357"/>
+            <a:ext cx="4108128" cy="2561468"/>
           </a:xfrm>
           <a:prstGeom prst="rect">
             <a:avLst/>
@@ -16950,7 +16950,7 @@
         </p:blipFill>
         <p:spPr>
           <a:xfrm>
-            <a:off x="433891" y="1228598"/>
+            <a:off x="6821978" y="752735"/>
             <a:ext cx="4949871" cy="2782044"/>
           </a:xfrm>
           <a:prstGeom prst="rect">
@@ -16980,7 +16980,7 @@
         </p:blipFill>
         <p:spPr>
           <a:xfrm>
-            <a:off x="433892" y="4010642"/>
+            <a:off x="6821979" y="3534779"/>
             <a:ext cx="4949871" cy="2782044"/>
           </a:xfrm>
           <a:prstGeom prst="rect">
@@ -17001,8 +17001,8 @@
           <p:nvPr/>
         </p:nvSpPr>
         <p:spPr>
-          <a:xfrm>
-            <a:off x="5490978" y="1946373"/>
+          <a:xfrm rot="10800000">
+            <a:off x="5393729" y="3193451"/>
             <a:ext cx="802434" cy="682656"/>
           </a:xfrm>
           <a:prstGeom prst="leftArrow">

</xml_diff>